<commit_message>
Update der Bilder Risikoanalyse und Stakeholderanalyse (ohne Übersichrift) als PNG. Einfügen dieser in die PPTX
</commit_message>
<xml_diff>
--- a/documentation/Praesentation.pptx
+++ b/documentation/Praesentation.pptx
@@ -5,7 +5,7 @@
     <p:sldMasterId id="2147483648" r:id="rId1"/>
   </p:sldMasterIdLst>
   <p:notesMasterIdLst>
-    <p:notesMasterId r:id="rId19"/>
+    <p:notesMasterId r:id="rId20"/>
   </p:notesMasterIdLst>
   <p:sldIdLst>
     <p:sldId id="850" r:id="rId2"/>
@@ -25,6 +25,7 @@
     <p:sldId id="3960" r:id="rId16"/>
     <p:sldId id="3951" r:id="rId17"/>
     <p:sldId id="3961" r:id="rId18"/>
+    <p:sldId id="3969" r:id="rId19"/>
   </p:sldIdLst>
   <p:sldSz cx="12192000" cy="6858000"/>
   <p:notesSz cx="6858000" cy="9144000"/>
@@ -142,6 +143,157 @@
 
 <file path=ppt/changesInfos/changesInfo1.xml><?xml version="1.0" encoding="utf-8"?>
 <pc:chgInfo xmlns:a="http://schemas.openxmlformats.org/drawingml/2006/main" xmlns:r="http://schemas.openxmlformats.org/officeDocument/2006/relationships" xmlns:ac="http://schemas.microsoft.com/office/drawing/2013/main/command" xmlns:pc="http://schemas.microsoft.com/office/powerpoint/2013/main/command">
+  <pc:docChgLst>
+    <pc:chgData name="Darko Šimić" userId="62208d8a821bc522" providerId="LiveId" clId="{B66891BC-4C46-48B8-B315-3D188F879164}"/>
+    <pc:docChg chg="undo custSel addSld delSld modSld sldOrd">
+      <pc:chgData name="Darko Šimić" userId="62208d8a821bc522" providerId="LiveId" clId="{B66891BC-4C46-48B8-B315-3D188F879164}" dt="2024-03-18T18:43:27.091" v="304" actId="20577"/>
+      <pc:docMkLst>
+        <pc:docMk/>
+      </pc:docMkLst>
+      <pc:sldChg chg="del ord">
+        <pc:chgData name="Darko Šimić" userId="62208d8a821bc522" providerId="LiveId" clId="{B66891BC-4C46-48B8-B315-3D188F879164}" dt="2024-03-18T18:41:37.820" v="229" actId="47"/>
+        <pc:sldMkLst>
+          <pc:docMk/>
+          <pc:sldMk cId="716004792" sldId="3949"/>
+        </pc:sldMkLst>
+      </pc:sldChg>
+      <pc:sldChg chg="modSp mod ord">
+        <pc:chgData name="Darko Šimić" userId="62208d8a821bc522" providerId="LiveId" clId="{B66891BC-4C46-48B8-B315-3D188F879164}" dt="2024-03-18T18:43:27.091" v="304" actId="20577"/>
+        <pc:sldMkLst>
+          <pc:docMk/>
+          <pc:sldMk cId="3731134899" sldId="3957"/>
+        </pc:sldMkLst>
+        <pc:spChg chg="mod">
+          <ac:chgData name="Darko Šimić" userId="62208d8a821bc522" providerId="LiveId" clId="{B66891BC-4C46-48B8-B315-3D188F879164}" dt="2024-03-18T18:43:27.091" v="304" actId="20577"/>
+          <ac:spMkLst>
+            <pc:docMk/>
+            <pc:sldMk cId="3731134899" sldId="3957"/>
+            <ac:spMk id="11" creationId="{EF356199-D7DD-824A-6BB9-FA8EF422E512}"/>
+          </ac:spMkLst>
+        </pc:spChg>
+      </pc:sldChg>
+      <pc:sldChg chg="modSp mod">
+        <pc:chgData name="Darko Šimić" userId="62208d8a821bc522" providerId="LiveId" clId="{B66891BC-4C46-48B8-B315-3D188F879164}" dt="2024-03-18T18:18:50.938" v="22" actId="1035"/>
+        <pc:sldMkLst>
+          <pc:docMk/>
+          <pc:sldMk cId="324696549" sldId="3961"/>
+        </pc:sldMkLst>
+        <pc:spChg chg="mod">
+          <ac:chgData name="Darko Šimić" userId="62208d8a821bc522" providerId="LiveId" clId="{B66891BC-4C46-48B8-B315-3D188F879164}" dt="2024-03-18T18:18:43.935" v="20" actId="20577"/>
+          <ac:spMkLst>
+            <pc:docMk/>
+            <pc:sldMk cId="324696549" sldId="3961"/>
+            <ac:spMk id="11" creationId="{EF356199-D7DD-824A-6BB9-FA8EF422E512}"/>
+          </ac:spMkLst>
+        </pc:spChg>
+        <pc:picChg chg="mod">
+          <ac:chgData name="Darko Šimić" userId="62208d8a821bc522" providerId="LiveId" clId="{B66891BC-4C46-48B8-B315-3D188F879164}" dt="2024-03-18T18:18:50.938" v="22" actId="1035"/>
+          <ac:picMkLst>
+            <pc:docMk/>
+            <pc:sldMk cId="324696549" sldId="3961"/>
+            <ac:picMk id="10" creationId="{55AA8678-6F68-BB2B-0034-E9BE27F0F5C9}"/>
+          </ac:picMkLst>
+        </pc:picChg>
+      </pc:sldChg>
+      <pc:sldChg chg="ord">
+        <pc:chgData name="Darko Šimić" userId="62208d8a821bc522" providerId="LiveId" clId="{B66891BC-4C46-48B8-B315-3D188F879164}" dt="2024-03-18T18:41:48.359" v="231"/>
+        <pc:sldMkLst>
+          <pc:docMk/>
+          <pc:sldMk cId="2940804774" sldId="3962"/>
+        </pc:sldMkLst>
+      </pc:sldChg>
+      <pc:sldChg chg="ord">
+        <pc:chgData name="Darko Šimić" userId="62208d8a821bc522" providerId="LiveId" clId="{B66891BC-4C46-48B8-B315-3D188F879164}" dt="2024-03-18T18:41:48.359" v="231"/>
+        <pc:sldMkLst>
+          <pc:docMk/>
+          <pc:sldMk cId="2066623647" sldId="3963"/>
+        </pc:sldMkLst>
+      </pc:sldChg>
+      <pc:sldChg chg="ord">
+        <pc:chgData name="Darko Šimić" userId="62208d8a821bc522" providerId="LiveId" clId="{B66891BC-4C46-48B8-B315-3D188F879164}" dt="2024-03-18T18:41:15.842" v="222"/>
+        <pc:sldMkLst>
+          <pc:docMk/>
+          <pc:sldMk cId="766324905" sldId="3964"/>
+        </pc:sldMkLst>
+      </pc:sldChg>
+      <pc:sldChg chg="modSp mod ord">
+        <pc:chgData name="Darko Šimić" userId="62208d8a821bc522" providerId="LiveId" clId="{B66891BC-4C46-48B8-B315-3D188F879164}" dt="2024-03-18T18:41:15.842" v="222"/>
+        <pc:sldMkLst>
+          <pc:docMk/>
+          <pc:sldMk cId="3179388592" sldId="3965"/>
+        </pc:sldMkLst>
+        <pc:picChg chg="mod">
+          <ac:chgData name="Darko Šimić" userId="62208d8a821bc522" providerId="LiveId" clId="{B66891BC-4C46-48B8-B315-3D188F879164}" dt="2024-03-18T18:07:15.667" v="0" actId="14826"/>
+          <ac:picMkLst>
+            <pc:docMk/>
+            <pc:sldMk cId="3179388592" sldId="3965"/>
+            <ac:picMk id="14" creationId="{F6DFD9D2-AAB9-7C8B-4C50-A979F658DDB9}"/>
+          </ac:picMkLst>
+        </pc:picChg>
+      </pc:sldChg>
+      <pc:sldChg chg="addSp delSp modSp add mod ord">
+        <pc:chgData name="Darko Šimić" userId="62208d8a821bc522" providerId="LiveId" clId="{B66891BC-4C46-48B8-B315-3D188F879164}" dt="2024-03-18T18:41:15.842" v="222"/>
+        <pc:sldMkLst>
+          <pc:docMk/>
+          <pc:sldMk cId="606085784" sldId="3966"/>
+        </pc:sldMkLst>
+        <pc:spChg chg="add mod">
+          <ac:chgData name="Darko Šimić" userId="62208d8a821bc522" providerId="LiveId" clId="{B66891BC-4C46-48B8-B315-3D188F879164}" dt="2024-03-18T18:38:53.039" v="218" actId="20577"/>
+          <ac:spMkLst>
+            <pc:docMk/>
+            <pc:sldMk cId="606085784" sldId="3966"/>
+            <ac:spMk id="2" creationId="{99D8DDB6-07D3-938A-56A3-C2CDF59BED56}"/>
+          </ac:spMkLst>
+        </pc:spChg>
+        <pc:spChg chg="mod">
+          <ac:chgData name="Darko Šimić" userId="62208d8a821bc522" providerId="LiveId" clId="{B66891BC-4C46-48B8-B315-3D188F879164}" dt="2024-03-18T18:29:15.093" v="88"/>
+          <ac:spMkLst>
+            <pc:docMk/>
+            <pc:sldMk cId="606085784" sldId="3966"/>
+            <ac:spMk id="11" creationId="{EF356199-D7DD-824A-6BB9-FA8EF422E512}"/>
+          </ac:spMkLst>
+        </pc:spChg>
+        <pc:picChg chg="del">
+          <ac:chgData name="Darko Šimić" userId="62208d8a821bc522" providerId="LiveId" clId="{B66891BC-4C46-48B8-B315-3D188F879164}" dt="2024-03-18T18:29:09.413" v="85" actId="478"/>
+          <ac:picMkLst>
+            <pc:docMk/>
+            <pc:sldMk cId="606085784" sldId="3966"/>
+            <ac:picMk id="14" creationId="{F6DFD9D2-AAB9-7C8B-4C50-A979F658DDB9}"/>
+          </ac:picMkLst>
+        </pc:picChg>
+      </pc:sldChg>
+      <pc:sldChg chg="modSp add mod ord">
+        <pc:chgData name="Darko Šimić" userId="62208d8a821bc522" providerId="LiveId" clId="{B66891BC-4C46-48B8-B315-3D188F879164}" dt="2024-03-18T18:41:15.842" v="222"/>
+        <pc:sldMkLst>
+          <pc:docMk/>
+          <pc:sldMk cId="3392917273" sldId="3967"/>
+        </pc:sldMkLst>
+        <pc:spChg chg="mod">
+          <ac:chgData name="Darko Šimić" userId="62208d8a821bc522" providerId="LiveId" clId="{B66891BC-4C46-48B8-B315-3D188F879164}" dt="2024-03-18T18:29:03.325" v="84" actId="1038"/>
+          <ac:spMkLst>
+            <pc:docMk/>
+            <pc:sldMk cId="3392917273" sldId="3967"/>
+            <ac:spMk id="8" creationId="{7EB54C7D-0876-48EC-85AA-C1ED4980DA99}"/>
+          </ac:spMkLst>
+        </pc:spChg>
+      </pc:sldChg>
+      <pc:sldChg chg="modSp add mod ord">
+        <pc:chgData name="Darko Šimić" userId="62208d8a821bc522" providerId="LiveId" clId="{B66891BC-4C46-48B8-B315-3D188F879164}" dt="2024-03-18T18:42:28.569" v="269" actId="1038"/>
+        <pc:sldMkLst>
+          <pc:docMk/>
+          <pc:sldMk cId="4284847010" sldId="3968"/>
+        </pc:sldMkLst>
+        <pc:spChg chg="mod">
+          <ac:chgData name="Darko Šimić" userId="62208d8a821bc522" providerId="LiveId" clId="{B66891BC-4C46-48B8-B315-3D188F879164}" dt="2024-03-18T18:42:28.569" v="269" actId="1038"/>
+          <ac:spMkLst>
+            <pc:docMk/>
+            <pc:sldMk cId="4284847010" sldId="3968"/>
+            <ac:spMk id="8" creationId="{7EB54C7D-0876-48EC-85AA-C1ED4980DA99}"/>
+          </ac:spMkLst>
+        </pc:spChg>
+      </pc:sldChg>
+    </pc:docChg>
+  </pc:docChgLst>
   <pc:docChgLst>
     <pc:chgData name="Simic, Darko" userId="1f521bb9-6638-478c-91d3-1e5e63cb3634" providerId="ADAL" clId="{198B78B8-A7E4-490D-A6A9-BA657094541F}"/>
     <pc:docChg chg="undo redo custSel addSld delSld modSld sldOrd">
@@ -756,157 +908,6 @@
       </pc:sldMasterChg>
     </pc:docChg>
   </pc:docChgLst>
-  <pc:docChgLst>
-    <pc:chgData name="Darko Šimić" userId="62208d8a821bc522" providerId="LiveId" clId="{B66891BC-4C46-48B8-B315-3D188F879164}"/>
-    <pc:docChg chg="undo custSel addSld delSld modSld sldOrd">
-      <pc:chgData name="Darko Šimić" userId="62208d8a821bc522" providerId="LiveId" clId="{B66891BC-4C46-48B8-B315-3D188F879164}" dt="2024-03-18T18:43:27.091" v="304" actId="20577"/>
-      <pc:docMkLst>
-        <pc:docMk/>
-      </pc:docMkLst>
-      <pc:sldChg chg="del ord">
-        <pc:chgData name="Darko Šimić" userId="62208d8a821bc522" providerId="LiveId" clId="{B66891BC-4C46-48B8-B315-3D188F879164}" dt="2024-03-18T18:41:37.820" v="229" actId="47"/>
-        <pc:sldMkLst>
-          <pc:docMk/>
-          <pc:sldMk cId="716004792" sldId="3949"/>
-        </pc:sldMkLst>
-      </pc:sldChg>
-      <pc:sldChg chg="modSp mod ord">
-        <pc:chgData name="Darko Šimić" userId="62208d8a821bc522" providerId="LiveId" clId="{B66891BC-4C46-48B8-B315-3D188F879164}" dt="2024-03-18T18:43:27.091" v="304" actId="20577"/>
-        <pc:sldMkLst>
-          <pc:docMk/>
-          <pc:sldMk cId="3731134899" sldId="3957"/>
-        </pc:sldMkLst>
-        <pc:spChg chg="mod">
-          <ac:chgData name="Darko Šimić" userId="62208d8a821bc522" providerId="LiveId" clId="{B66891BC-4C46-48B8-B315-3D188F879164}" dt="2024-03-18T18:43:27.091" v="304" actId="20577"/>
-          <ac:spMkLst>
-            <pc:docMk/>
-            <pc:sldMk cId="3731134899" sldId="3957"/>
-            <ac:spMk id="11" creationId="{EF356199-D7DD-824A-6BB9-FA8EF422E512}"/>
-          </ac:spMkLst>
-        </pc:spChg>
-      </pc:sldChg>
-      <pc:sldChg chg="modSp mod">
-        <pc:chgData name="Darko Šimić" userId="62208d8a821bc522" providerId="LiveId" clId="{B66891BC-4C46-48B8-B315-3D188F879164}" dt="2024-03-18T18:18:50.938" v="22" actId="1035"/>
-        <pc:sldMkLst>
-          <pc:docMk/>
-          <pc:sldMk cId="324696549" sldId="3961"/>
-        </pc:sldMkLst>
-        <pc:spChg chg="mod">
-          <ac:chgData name="Darko Šimić" userId="62208d8a821bc522" providerId="LiveId" clId="{B66891BC-4C46-48B8-B315-3D188F879164}" dt="2024-03-18T18:18:43.935" v="20" actId="20577"/>
-          <ac:spMkLst>
-            <pc:docMk/>
-            <pc:sldMk cId="324696549" sldId="3961"/>
-            <ac:spMk id="11" creationId="{EF356199-D7DD-824A-6BB9-FA8EF422E512}"/>
-          </ac:spMkLst>
-        </pc:spChg>
-        <pc:picChg chg="mod">
-          <ac:chgData name="Darko Šimić" userId="62208d8a821bc522" providerId="LiveId" clId="{B66891BC-4C46-48B8-B315-3D188F879164}" dt="2024-03-18T18:18:50.938" v="22" actId="1035"/>
-          <ac:picMkLst>
-            <pc:docMk/>
-            <pc:sldMk cId="324696549" sldId="3961"/>
-            <ac:picMk id="10" creationId="{55AA8678-6F68-BB2B-0034-E9BE27F0F5C9}"/>
-          </ac:picMkLst>
-        </pc:picChg>
-      </pc:sldChg>
-      <pc:sldChg chg="ord">
-        <pc:chgData name="Darko Šimić" userId="62208d8a821bc522" providerId="LiveId" clId="{B66891BC-4C46-48B8-B315-3D188F879164}" dt="2024-03-18T18:41:48.359" v="231"/>
-        <pc:sldMkLst>
-          <pc:docMk/>
-          <pc:sldMk cId="2940804774" sldId="3962"/>
-        </pc:sldMkLst>
-      </pc:sldChg>
-      <pc:sldChg chg="ord">
-        <pc:chgData name="Darko Šimić" userId="62208d8a821bc522" providerId="LiveId" clId="{B66891BC-4C46-48B8-B315-3D188F879164}" dt="2024-03-18T18:41:48.359" v="231"/>
-        <pc:sldMkLst>
-          <pc:docMk/>
-          <pc:sldMk cId="2066623647" sldId="3963"/>
-        </pc:sldMkLst>
-      </pc:sldChg>
-      <pc:sldChg chg="ord">
-        <pc:chgData name="Darko Šimić" userId="62208d8a821bc522" providerId="LiveId" clId="{B66891BC-4C46-48B8-B315-3D188F879164}" dt="2024-03-18T18:41:15.842" v="222"/>
-        <pc:sldMkLst>
-          <pc:docMk/>
-          <pc:sldMk cId="766324905" sldId="3964"/>
-        </pc:sldMkLst>
-      </pc:sldChg>
-      <pc:sldChg chg="modSp mod ord">
-        <pc:chgData name="Darko Šimić" userId="62208d8a821bc522" providerId="LiveId" clId="{B66891BC-4C46-48B8-B315-3D188F879164}" dt="2024-03-18T18:41:15.842" v="222"/>
-        <pc:sldMkLst>
-          <pc:docMk/>
-          <pc:sldMk cId="3179388592" sldId="3965"/>
-        </pc:sldMkLst>
-        <pc:picChg chg="mod">
-          <ac:chgData name="Darko Šimić" userId="62208d8a821bc522" providerId="LiveId" clId="{B66891BC-4C46-48B8-B315-3D188F879164}" dt="2024-03-18T18:07:15.667" v="0" actId="14826"/>
-          <ac:picMkLst>
-            <pc:docMk/>
-            <pc:sldMk cId="3179388592" sldId="3965"/>
-            <ac:picMk id="14" creationId="{F6DFD9D2-AAB9-7C8B-4C50-A979F658DDB9}"/>
-          </ac:picMkLst>
-        </pc:picChg>
-      </pc:sldChg>
-      <pc:sldChg chg="addSp delSp modSp add mod ord">
-        <pc:chgData name="Darko Šimić" userId="62208d8a821bc522" providerId="LiveId" clId="{B66891BC-4C46-48B8-B315-3D188F879164}" dt="2024-03-18T18:41:15.842" v="222"/>
-        <pc:sldMkLst>
-          <pc:docMk/>
-          <pc:sldMk cId="606085784" sldId="3966"/>
-        </pc:sldMkLst>
-        <pc:spChg chg="add mod">
-          <ac:chgData name="Darko Šimić" userId="62208d8a821bc522" providerId="LiveId" clId="{B66891BC-4C46-48B8-B315-3D188F879164}" dt="2024-03-18T18:38:53.039" v="218" actId="20577"/>
-          <ac:spMkLst>
-            <pc:docMk/>
-            <pc:sldMk cId="606085784" sldId="3966"/>
-            <ac:spMk id="2" creationId="{99D8DDB6-07D3-938A-56A3-C2CDF59BED56}"/>
-          </ac:spMkLst>
-        </pc:spChg>
-        <pc:spChg chg="mod">
-          <ac:chgData name="Darko Šimić" userId="62208d8a821bc522" providerId="LiveId" clId="{B66891BC-4C46-48B8-B315-3D188F879164}" dt="2024-03-18T18:29:15.093" v="88"/>
-          <ac:spMkLst>
-            <pc:docMk/>
-            <pc:sldMk cId="606085784" sldId="3966"/>
-            <ac:spMk id="11" creationId="{EF356199-D7DD-824A-6BB9-FA8EF422E512}"/>
-          </ac:spMkLst>
-        </pc:spChg>
-        <pc:picChg chg="del">
-          <ac:chgData name="Darko Šimić" userId="62208d8a821bc522" providerId="LiveId" clId="{B66891BC-4C46-48B8-B315-3D188F879164}" dt="2024-03-18T18:29:09.413" v="85" actId="478"/>
-          <ac:picMkLst>
-            <pc:docMk/>
-            <pc:sldMk cId="606085784" sldId="3966"/>
-            <ac:picMk id="14" creationId="{F6DFD9D2-AAB9-7C8B-4C50-A979F658DDB9}"/>
-          </ac:picMkLst>
-        </pc:picChg>
-      </pc:sldChg>
-      <pc:sldChg chg="modSp add mod ord">
-        <pc:chgData name="Darko Šimić" userId="62208d8a821bc522" providerId="LiveId" clId="{B66891BC-4C46-48B8-B315-3D188F879164}" dt="2024-03-18T18:41:15.842" v="222"/>
-        <pc:sldMkLst>
-          <pc:docMk/>
-          <pc:sldMk cId="3392917273" sldId="3967"/>
-        </pc:sldMkLst>
-        <pc:spChg chg="mod">
-          <ac:chgData name="Darko Šimić" userId="62208d8a821bc522" providerId="LiveId" clId="{B66891BC-4C46-48B8-B315-3D188F879164}" dt="2024-03-18T18:29:03.325" v="84" actId="1038"/>
-          <ac:spMkLst>
-            <pc:docMk/>
-            <pc:sldMk cId="3392917273" sldId="3967"/>
-            <ac:spMk id="8" creationId="{7EB54C7D-0876-48EC-85AA-C1ED4980DA99}"/>
-          </ac:spMkLst>
-        </pc:spChg>
-      </pc:sldChg>
-      <pc:sldChg chg="modSp add mod ord">
-        <pc:chgData name="Darko Šimić" userId="62208d8a821bc522" providerId="LiveId" clId="{B66891BC-4C46-48B8-B315-3D188F879164}" dt="2024-03-18T18:42:28.569" v="269" actId="1038"/>
-        <pc:sldMkLst>
-          <pc:docMk/>
-          <pc:sldMk cId="4284847010" sldId="3968"/>
-        </pc:sldMkLst>
-        <pc:spChg chg="mod">
-          <ac:chgData name="Darko Šimić" userId="62208d8a821bc522" providerId="LiveId" clId="{B66891BC-4C46-48B8-B315-3D188F879164}" dt="2024-03-18T18:42:28.569" v="269" actId="1038"/>
-          <ac:spMkLst>
-            <pc:docMk/>
-            <pc:sldMk cId="4284847010" sldId="3968"/>
-            <ac:spMk id="8" creationId="{7EB54C7D-0876-48EC-85AA-C1ED4980DA99}"/>
-          </ac:spMkLst>
-        </pc:spChg>
-      </pc:sldChg>
-    </pc:docChg>
-  </pc:docChgLst>
 </pc:chgInfo>
 </file>
 
@@ -992,7 +993,7 @@
           <a:p>
             <a:fld id="{07B8BF4F-CA06-4724-9238-68EBFDA3ECF6}" type="datetimeFigureOut">
               <a:rPr lang="de-DE" smtClean="0"/>
-              <a:t>18.03.2024</a:t>
+              <a:t>19.03.2024</a:t>
             </a:fld>
             <a:endParaRPr lang="de-DE"/>
           </a:p>
@@ -1574,7 +1575,7 @@
           <a:p>
             <a:fld id="{D1F11022-C40E-4EFC-84BC-C86197C275D9}" type="datetimeFigureOut">
               <a:rPr lang="de-DE" smtClean="0"/>
-              <a:t>18.03.2024</a:t>
+              <a:t>19.03.2024</a:t>
             </a:fld>
             <a:endParaRPr lang="de-DE"/>
           </a:p>
@@ -1772,7 +1773,7 @@
           <a:p>
             <a:fld id="{D1F11022-C40E-4EFC-84BC-C86197C275D9}" type="datetimeFigureOut">
               <a:rPr lang="de-DE" smtClean="0"/>
-              <a:t>18.03.2024</a:t>
+              <a:t>19.03.2024</a:t>
             </a:fld>
             <a:endParaRPr lang="de-DE"/>
           </a:p>
@@ -1980,7 +1981,7 @@
           <a:p>
             <a:fld id="{D1F11022-C40E-4EFC-84BC-C86197C275D9}" type="datetimeFigureOut">
               <a:rPr lang="de-DE" smtClean="0"/>
-              <a:t>18.03.2024</a:t>
+              <a:t>19.03.2024</a:t>
             </a:fld>
             <a:endParaRPr lang="de-DE"/>
           </a:p>
@@ -2260,7 +2261,7 @@
             <a:pPr algn="r"/>
             <a:fld id="{97728B36-2AAA-419D-83E6-AC7881E8E844}" type="datetime1">
               <a:rPr lang="en-US" smtClean="0"/>
-              <a:t>3/18/2024</a:t>
+              <a:t>3/19/2024</a:t>
             </a:fld>
             <a:endParaRPr lang="de-DE" dirty="0"/>
           </a:p>
@@ -2842,7 +2843,7 @@
           <a:p>
             <a:fld id="{D1F11022-C40E-4EFC-84BC-C86197C275D9}" type="datetimeFigureOut">
               <a:rPr lang="de-DE" smtClean="0"/>
-              <a:t>18.03.2024</a:t>
+              <a:t>19.03.2024</a:t>
             </a:fld>
             <a:endParaRPr lang="de-DE"/>
           </a:p>
@@ -3117,7 +3118,7 @@
           <a:p>
             <a:fld id="{D1F11022-C40E-4EFC-84BC-C86197C275D9}" type="datetimeFigureOut">
               <a:rPr lang="de-DE" smtClean="0"/>
-              <a:t>18.03.2024</a:t>
+              <a:t>19.03.2024</a:t>
             </a:fld>
             <a:endParaRPr lang="de-DE"/>
           </a:p>
@@ -3382,7 +3383,7 @@
           <a:p>
             <a:fld id="{D1F11022-C40E-4EFC-84BC-C86197C275D9}" type="datetimeFigureOut">
               <a:rPr lang="de-DE" smtClean="0"/>
-              <a:t>18.03.2024</a:t>
+              <a:t>19.03.2024</a:t>
             </a:fld>
             <a:endParaRPr lang="de-DE"/>
           </a:p>
@@ -3794,7 +3795,7 @@
           <a:p>
             <a:fld id="{D1F11022-C40E-4EFC-84BC-C86197C275D9}" type="datetimeFigureOut">
               <a:rPr lang="de-DE" smtClean="0"/>
-              <a:t>18.03.2024</a:t>
+              <a:t>19.03.2024</a:t>
             </a:fld>
             <a:endParaRPr lang="de-DE"/>
           </a:p>
@@ -3935,7 +3936,7 @@
           <a:p>
             <a:fld id="{D1F11022-C40E-4EFC-84BC-C86197C275D9}" type="datetimeFigureOut">
               <a:rPr lang="de-DE" smtClean="0"/>
-              <a:t>18.03.2024</a:t>
+              <a:t>19.03.2024</a:t>
             </a:fld>
             <a:endParaRPr lang="de-DE"/>
           </a:p>
@@ -4048,7 +4049,7 @@
           <a:p>
             <a:fld id="{D1F11022-C40E-4EFC-84BC-C86197C275D9}" type="datetimeFigureOut">
               <a:rPr lang="de-DE" smtClean="0"/>
-              <a:t>18.03.2024</a:t>
+              <a:t>19.03.2024</a:t>
             </a:fld>
             <a:endParaRPr lang="de-DE"/>
           </a:p>
@@ -4359,7 +4360,7 @@
           <a:p>
             <a:fld id="{D1F11022-C40E-4EFC-84BC-C86197C275D9}" type="datetimeFigureOut">
               <a:rPr lang="de-DE" smtClean="0"/>
-              <a:t>18.03.2024</a:t>
+              <a:t>19.03.2024</a:t>
             </a:fld>
             <a:endParaRPr lang="de-DE"/>
           </a:p>
@@ -4647,7 +4648,7 @@
           <a:p>
             <a:fld id="{D1F11022-C40E-4EFC-84BC-C86197C275D9}" type="datetimeFigureOut">
               <a:rPr lang="de-DE" smtClean="0"/>
-              <a:t>18.03.2024</a:t>
+              <a:t>19.03.2024</a:t>
             </a:fld>
             <a:endParaRPr lang="de-DE"/>
           </a:p>
@@ -4888,7 +4889,7 @@
           <a:p>
             <a:fld id="{D1F11022-C40E-4EFC-84BC-C86197C275D9}" type="datetimeFigureOut">
               <a:rPr lang="de-DE" smtClean="0"/>
-              <a:t>18.03.2024</a:t>
+              <a:t>19.03.2024</a:t>
             </a:fld>
             <a:endParaRPr lang="de-DE"/>
           </a:p>
@@ -8541,51 +8542,6 @@
           </a:p>
         </p:txBody>
       </p:sp>
-      <p:pic>
-        <p:nvPicPr>
-          <p:cNvPr id="14" name="Grafik 13">
-            <a:extLst>
-              <a:ext uri="{FF2B5EF4-FFF2-40B4-BE49-F238E27FC236}">
-                <a16:creationId xmlns:a16="http://schemas.microsoft.com/office/drawing/2014/main" id="{F6DFD9D2-AAB9-7C8B-4C50-A979F658DDB9}"/>
-              </a:ext>
-            </a:extLst>
-          </p:cNvPr>
-          <p:cNvPicPr>
-            <a:picLocks noChangeAspect="1"/>
-          </p:cNvPicPr>
-          <p:nvPr/>
-        </p:nvPicPr>
-        <p:blipFill>
-          <a:blip r:embed="rId3">
-            <a:extLst>
-              <a:ext uri="{28A0092B-C50C-407E-A947-70E740481C1C}">
-                <a14:useLocalDpi xmlns:a14="http://schemas.microsoft.com/office/drawing/2010/main" val="0"/>
-              </a:ext>
-            </a:extLst>
-          </a:blip>
-          <a:srcRect/>
-          <a:stretch/>
-        </p:blipFill>
-        <p:spPr>
-          <a:xfrm>
-            <a:off x="2813148" y="1381238"/>
-            <a:ext cx="6379012" cy="4460122"/>
-          </a:xfrm>
-          <a:prstGeom prst="rect">
-            <a:avLst/>
-          </a:prstGeom>
-          <a:ln>
-            <a:noFill/>
-          </a:ln>
-          <a:effectLst>
-            <a:outerShdw blurRad="292100" dist="139700" dir="2700000" algn="tl" rotWithShape="0">
-              <a:srgbClr val="333333">
-                <a:alpha val="65000"/>
-              </a:srgbClr>
-            </a:outerShdw>
-          </a:effectLst>
-        </p:spPr>
-      </p:pic>
       <p:sp>
         <p:nvSpPr>
           <p:cNvPr id="9" name="Fußzeilenplatzhalter 4">
@@ -9000,6 +8956,42 @@
           </a:p>
         </p:txBody>
       </p:sp>
+      <p:pic>
+        <p:nvPicPr>
+          <p:cNvPr id="3" name="Grafik 2">
+            <a:extLst>
+              <a:ext uri="{FF2B5EF4-FFF2-40B4-BE49-F238E27FC236}">
+                <a16:creationId xmlns:a16="http://schemas.microsoft.com/office/drawing/2014/main" id="{57261AFE-7F51-F568-F197-A573E9B07359}"/>
+              </a:ext>
+            </a:extLst>
+          </p:cNvPr>
+          <p:cNvPicPr>
+            <a:picLocks noChangeAspect="1"/>
+          </p:cNvPicPr>
+          <p:nvPr/>
+        </p:nvPicPr>
+        <p:blipFill>
+          <a:blip r:embed="rId3">
+            <a:extLst>
+              <a:ext uri="{28A0092B-C50C-407E-A947-70E740481C1C}">
+                <a14:useLocalDpi xmlns:a14="http://schemas.microsoft.com/office/drawing/2010/main" val="0"/>
+              </a:ext>
+            </a:extLst>
+          </a:blip>
+          <a:stretch>
+            <a:fillRect/>
+          </a:stretch>
+        </p:blipFill>
+        <p:spPr>
+          <a:xfrm>
+            <a:off x="2833232" y="1295102"/>
+            <a:ext cx="6525536" cy="4267796"/>
+          </a:xfrm>
+          <a:prstGeom prst="rect">
+            <a:avLst/>
+          </a:prstGeom>
+        </p:spPr>
+      </p:pic>
     </p:spTree>
     <p:extLst>
       <p:ext uri="{BB962C8B-B14F-4D97-AF65-F5344CB8AC3E}">
@@ -9606,51 +9598,6 @@
           </a:p>
         </p:txBody>
       </p:sp>
-      <p:pic>
-        <p:nvPicPr>
-          <p:cNvPr id="14" name="Grafik 13">
-            <a:extLst>
-              <a:ext uri="{FF2B5EF4-FFF2-40B4-BE49-F238E27FC236}">
-                <a16:creationId xmlns:a16="http://schemas.microsoft.com/office/drawing/2014/main" id="{F6DFD9D2-AAB9-7C8B-4C50-A979F658DDB9}"/>
-              </a:ext>
-            </a:extLst>
-          </p:cNvPr>
-          <p:cNvPicPr>
-            <a:picLocks noChangeAspect="1"/>
-          </p:cNvPicPr>
-          <p:nvPr/>
-        </p:nvPicPr>
-        <p:blipFill>
-          <a:blip r:embed="rId3">
-            <a:extLst>
-              <a:ext uri="{28A0092B-C50C-407E-A947-70E740481C1C}">
-                <a14:useLocalDpi xmlns:a14="http://schemas.microsoft.com/office/drawing/2010/main" val="0"/>
-              </a:ext>
-            </a:extLst>
-          </a:blip>
-          <a:srcRect/>
-          <a:stretch/>
-        </p:blipFill>
-        <p:spPr>
-          <a:xfrm>
-            <a:off x="3983593" y="1121747"/>
-            <a:ext cx="4038122" cy="4979105"/>
-          </a:xfrm>
-          <a:prstGeom prst="rect">
-            <a:avLst/>
-          </a:prstGeom>
-          <a:ln>
-            <a:noFill/>
-          </a:ln>
-          <a:effectLst>
-            <a:outerShdw blurRad="292100" dist="139700" dir="2700000" algn="tl" rotWithShape="0">
-              <a:srgbClr val="333333">
-                <a:alpha val="65000"/>
-              </a:srgbClr>
-            </a:outerShdw>
-          </a:effectLst>
-        </p:spPr>
-      </p:pic>
       <p:sp>
         <p:nvSpPr>
           <p:cNvPr id="9" name="Fußzeilenplatzhalter 4">
@@ -10065,6 +10012,42 @@
           </a:p>
         </p:txBody>
       </p:sp>
+      <p:pic>
+        <p:nvPicPr>
+          <p:cNvPr id="3" name="Grafik 2">
+            <a:extLst>
+              <a:ext uri="{FF2B5EF4-FFF2-40B4-BE49-F238E27FC236}">
+                <a16:creationId xmlns:a16="http://schemas.microsoft.com/office/drawing/2014/main" id="{C7792C54-50CE-7084-F376-3FFA326AA587}"/>
+              </a:ext>
+            </a:extLst>
+          </p:cNvPr>
+          <p:cNvPicPr>
+            <a:picLocks noChangeAspect="1"/>
+          </p:cNvPicPr>
+          <p:nvPr/>
+        </p:nvPicPr>
+        <p:blipFill>
+          <a:blip r:embed="rId3">
+            <a:extLst>
+              <a:ext uri="{28A0092B-C50C-407E-A947-70E740481C1C}">
+                <a14:useLocalDpi xmlns:a14="http://schemas.microsoft.com/office/drawing/2010/main" val="0"/>
+              </a:ext>
+            </a:extLst>
+          </a:blip>
+          <a:stretch>
+            <a:fillRect/>
+          </a:stretch>
+        </p:blipFill>
+        <p:spPr>
+          <a:xfrm>
+            <a:off x="3271443" y="1699971"/>
+            <a:ext cx="5649113" cy="3458058"/>
+          </a:xfrm>
+          <a:prstGeom prst="rect">
+            <a:avLst/>
+          </a:prstGeom>
+        </p:spPr>
+      </p:pic>
     </p:spTree>
     <p:extLst>
       <p:ext uri="{BB962C8B-B14F-4D97-AF65-F5344CB8AC3E}">
@@ -10082,6 +10065,594 @@
       </p:transition>
     </mc:Choice>
     <mc:Fallback xmlns="">
+      <p:transition spd="med">
+        <p:fade/>
+      </p:transition>
+    </mc:Fallback>
+  </mc:AlternateContent>
+</p:sld>
+</file>
+
+<file path=ppt/slides/slide18.xml><?xml version="1.0" encoding="utf-8"?>
+<p:sld xmlns:a="http://schemas.openxmlformats.org/drawingml/2006/main" xmlns:r="http://schemas.openxmlformats.org/officeDocument/2006/relationships" xmlns:p="http://schemas.openxmlformats.org/presentationml/2006/main">
+  <p:cSld>
+    <p:spTree>
+      <p:nvGrpSpPr>
+        <p:cNvPr id="1" name=""/>
+        <p:cNvGrpSpPr/>
+        <p:nvPr/>
+      </p:nvGrpSpPr>
+      <p:grpSpPr>
+        <a:xfrm>
+          <a:off x="0" y="0"/>
+          <a:ext cx="0" cy="0"/>
+          <a:chOff x="0" y="0"/>
+          <a:chExt cx="0" cy="0"/>
+        </a:xfrm>
+      </p:grpSpPr>
+      <p:pic>
+        <p:nvPicPr>
+          <p:cNvPr id="10" name="Grafik 9">
+            <a:extLst>
+              <a:ext uri="{FF2B5EF4-FFF2-40B4-BE49-F238E27FC236}">
+                <a16:creationId xmlns:a16="http://schemas.microsoft.com/office/drawing/2014/main" id="{55AA8678-6F68-BB2B-0034-E9BE27F0F5C9}"/>
+              </a:ext>
+            </a:extLst>
+          </p:cNvPr>
+          <p:cNvPicPr>
+            <a:picLocks noChangeAspect="1"/>
+          </p:cNvPicPr>
+          <p:nvPr/>
+        </p:nvPicPr>
+        <p:blipFill>
+          <a:blip r:embed="rId2">
+            <a:lum bright="70000" contrast="-70000"/>
+            <a:extLst>
+              <a:ext uri="{28A0092B-C50C-407E-A947-70E740481C1C}">
+                <a14:useLocalDpi xmlns:a14="http://schemas.microsoft.com/office/drawing/2010/main" val="0"/>
+              </a:ext>
+            </a:extLst>
+          </a:blip>
+          <a:srcRect/>
+          <a:stretch/>
+        </p:blipFill>
+        <p:spPr>
+          <a:xfrm>
+            <a:off x="0" y="-18287"/>
+            <a:ext cx="12192000" cy="6858000"/>
+          </a:xfrm>
+          <a:prstGeom prst="rect">
+            <a:avLst/>
+          </a:prstGeom>
+          <a:gradFill flip="none" rotWithShape="1">
+            <a:gsLst>
+              <a:gs pos="0">
+                <a:schemeClr val="accent4">
+                  <a:lumMod val="5000"/>
+                  <a:lumOff val="95000"/>
+                </a:schemeClr>
+              </a:gs>
+              <a:gs pos="74000">
+                <a:schemeClr val="accent4">
+                  <a:lumMod val="45000"/>
+                  <a:lumOff val="55000"/>
+                </a:schemeClr>
+              </a:gs>
+              <a:gs pos="83000">
+                <a:schemeClr val="accent4">
+                  <a:lumMod val="45000"/>
+                  <a:lumOff val="55000"/>
+                </a:schemeClr>
+              </a:gs>
+              <a:gs pos="100000">
+                <a:schemeClr val="accent4">
+                  <a:lumMod val="30000"/>
+                  <a:lumOff val="70000"/>
+                </a:schemeClr>
+              </a:gs>
+            </a:gsLst>
+            <a:lin ang="5400000" scaled="1"/>
+            <a:tileRect/>
+          </a:gradFill>
+        </p:spPr>
+      </p:pic>
+      <p:sp>
+        <p:nvSpPr>
+          <p:cNvPr id="6" name="Foliennummernplatzhalter 5">
+            <a:extLst>
+              <a:ext uri="{FF2B5EF4-FFF2-40B4-BE49-F238E27FC236}">
+                <a16:creationId xmlns:a16="http://schemas.microsoft.com/office/drawing/2014/main" id="{58F93A26-7188-4BA5-8868-D6F75BEAE95C}"/>
+              </a:ext>
+            </a:extLst>
+          </p:cNvPr>
+          <p:cNvSpPr>
+            <a:spLocks noGrp="1"/>
+          </p:cNvSpPr>
+          <p:nvPr>
+            <p:ph type="sldNum" sz="quarter" idx="21"/>
+          </p:nvPr>
+        </p:nvSpPr>
+        <p:spPr/>
+        <p:txBody>
+          <a:bodyPr/>
+          <a:lstStyle/>
+          <a:p>
+            <a:fld id="{94176041-F611-405A-BB9C-F44B4516A572}" type="slidenum">
+              <a:rPr lang="de-DE" smtClean="0"/>
+              <a:pPr/>
+              <a:t>18</a:t>
+            </a:fld>
+            <a:endParaRPr lang="de-DE" dirty="0"/>
+          </a:p>
+        </p:txBody>
+      </p:sp>
+      <p:sp>
+        <p:nvSpPr>
+          <p:cNvPr id="9" name="Fußzeilenplatzhalter 4">
+            <a:extLst>
+              <a:ext uri="{FF2B5EF4-FFF2-40B4-BE49-F238E27FC236}">
+                <a16:creationId xmlns:a16="http://schemas.microsoft.com/office/drawing/2014/main" id="{60F41467-0CCF-750D-D385-3D83EC586882}"/>
+              </a:ext>
+            </a:extLst>
+          </p:cNvPr>
+          <p:cNvSpPr txBox="1">
+            <a:spLocks/>
+          </p:cNvSpPr>
+          <p:nvPr/>
+        </p:nvSpPr>
+        <p:spPr bwMode="gray">
+          <a:xfrm>
+            <a:off x="334963" y="6524985"/>
+            <a:ext cx="10211293" cy="143099"/>
+          </a:xfrm>
+          <a:prstGeom prst="rect">
+            <a:avLst/>
+          </a:prstGeom>
+          <a:noFill/>
+        </p:spPr>
+        <p:txBody>
+          <a:bodyPr vert="horz" lIns="0" tIns="0" rIns="0" bIns="0" rtlCol="0" anchor="ctr">
+            <a:noAutofit/>
+          </a:bodyPr>
+          <a:lstStyle>
+            <a:defPPr>
+              <a:defRPr lang="en-US"/>
+            </a:defPPr>
+            <a:lvl1pPr marL="0" algn="l" defTabSz="914400" rtl="0" eaLnBrk="1" latinLnBrk="0" hangingPunct="1">
+              <a:defRPr sz="900" kern="1200">
+                <a:solidFill>
+                  <a:schemeClr val="tx2"/>
+                </a:solidFill>
+                <a:latin typeface="+mn-lt"/>
+                <a:ea typeface="+mn-ea"/>
+                <a:cs typeface="+mn-cs"/>
+              </a:defRPr>
+            </a:lvl1pPr>
+            <a:lvl2pPr marL="0" indent="0" algn="l" defTabSz="914400" rtl="0" eaLnBrk="1" latinLnBrk="0" hangingPunct="1">
+              <a:defRPr sz="900" kern="1200">
+                <a:solidFill>
+                  <a:schemeClr val="tx2">
+                    <a:lumMod val="75000"/>
+                  </a:schemeClr>
+                </a:solidFill>
+                <a:latin typeface="+mn-lt"/>
+                <a:ea typeface="+mn-ea"/>
+                <a:cs typeface="+mn-cs"/>
+              </a:defRPr>
+            </a:lvl2pPr>
+            <a:lvl3pPr marL="0" indent="0" algn="l" defTabSz="914400" rtl="0" eaLnBrk="1" latinLnBrk="0" hangingPunct="1">
+              <a:defRPr sz="900" kern="1200">
+                <a:solidFill>
+                  <a:schemeClr val="tx2">
+                    <a:lumMod val="75000"/>
+                  </a:schemeClr>
+                </a:solidFill>
+                <a:latin typeface="+mn-lt"/>
+                <a:ea typeface="+mn-ea"/>
+                <a:cs typeface="+mn-cs"/>
+              </a:defRPr>
+            </a:lvl3pPr>
+            <a:lvl4pPr marL="0" indent="0" algn="l" defTabSz="914400" rtl="0" eaLnBrk="1" latinLnBrk="0" hangingPunct="1">
+              <a:defRPr sz="900" kern="1200">
+                <a:solidFill>
+                  <a:schemeClr val="tx2">
+                    <a:lumMod val="75000"/>
+                  </a:schemeClr>
+                </a:solidFill>
+                <a:latin typeface="+mn-lt"/>
+                <a:ea typeface="+mn-ea"/>
+                <a:cs typeface="+mn-cs"/>
+              </a:defRPr>
+            </a:lvl4pPr>
+            <a:lvl5pPr marL="0" indent="0" algn="l" defTabSz="914400" rtl="0" eaLnBrk="1" latinLnBrk="0" hangingPunct="1">
+              <a:defRPr sz="900" kern="1200">
+                <a:solidFill>
+                  <a:schemeClr val="tx2">
+                    <a:lumMod val="75000"/>
+                  </a:schemeClr>
+                </a:solidFill>
+                <a:latin typeface="+mn-lt"/>
+                <a:ea typeface="+mn-ea"/>
+                <a:cs typeface="+mn-cs"/>
+              </a:defRPr>
+            </a:lvl5pPr>
+            <a:lvl6pPr marL="0" indent="0" algn="l" defTabSz="914400" rtl="0" eaLnBrk="1" latinLnBrk="0" hangingPunct="1">
+              <a:defRPr sz="900" kern="1200">
+                <a:solidFill>
+                  <a:schemeClr val="tx2">
+                    <a:lumMod val="75000"/>
+                  </a:schemeClr>
+                </a:solidFill>
+                <a:latin typeface="+mn-lt"/>
+                <a:ea typeface="+mn-ea"/>
+                <a:cs typeface="+mn-cs"/>
+              </a:defRPr>
+            </a:lvl6pPr>
+            <a:lvl7pPr marL="0" indent="0" algn="l" defTabSz="914400" rtl="0" eaLnBrk="1" latinLnBrk="0" hangingPunct="1">
+              <a:defRPr sz="900" kern="1200">
+                <a:solidFill>
+                  <a:schemeClr val="tx2">
+                    <a:lumMod val="75000"/>
+                  </a:schemeClr>
+                </a:solidFill>
+                <a:latin typeface="+mn-lt"/>
+                <a:ea typeface="+mn-ea"/>
+                <a:cs typeface="+mn-cs"/>
+              </a:defRPr>
+            </a:lvl7pPr>
+            <a:lvl8pPr marL="0" indent="0" algn="l" defTabSz="914400" rtl="0" eaLnBrk="1" latinLnBrk="0" hangingPunct="1">
+              <a:defRPr sz="900" kern="1200">
+                <a:solidFill>
+                  <a:schemeClr val="tx2">
+                    <a:lumMod val="75000"/>
+                  </a:schemeClr>
+                </a:solidFill>
+                <a:latin typeface="+mn-lt"/>
+                <a:ea typeface="+mn-ea"/>
+                <a:cs typeface="+mn-cs"/>
+              </a:defRPr>
+            </a:lvl8pPr>
+            <a:lvl9pPr marL="0" indent="0" algn="l" defTabSz="914400" rtl="0" eaLnBrk="1" latinLnBrk="0" hangingPunct="1">
+              <a:defRPr sz="900" kern="1200">
+                <a:solidFill>
+                  <a:schemeClr val="tx2">
+                    <a:lumMod val="75000"/>
+                  </a:schemeClr>
+                </a:solidFill>
+                <a:latin typeface="+mn-lt"/>
+                <a:ea typeface="+mn-ea"/>
+                <a:cs typeface="+mn-cs"/>
+              </a:defRPr>
+            </a:lvl9pPr>
+          </a:lstStyle>
+          <a:p>
+            <a:r>
+              <a:rPr lang="de-DE" b="1" dirty="0">
+                <a:solidFill>
+                  <a:schemeClr val="tx1"/>
+                </a:solidFill>
+                <a:latin typeface="Arial"/>
+                <a:ea typeface="Microsoft YaHei"/>
+              </a:rPr>
+              <a:t>Team PM_A_5 | Collectiqo – Webanwendung zur Digitalisierung von Sammlungen</a:t>
+            </a:r>
+          </a:p>
+        </p:txBody>
+      </p:sp>
+      <p:sp>
+        <p:nvSpPr>
+          <p:cNvPr id="11" name="Inhaltsplatzhalter 3">
+            <a:extLst>
+              <a:ext uri="{FF2B5EF4-FFF2-40B4-BE49-F238E27FC236}">
+                <a16:creationId xmlns:a16="http://schemas.microsoft.com/office/drawing/2014/main" id="{EF356199-D7DD-824A-6BB9-FA8EF422E512}"/>
+              </a:ext>
+            </a:extLst>
+          </p:cNvPr>
+          <p:cNvSpPr txBox="1">
+            <a:spLocks/>
+          </p:cNvSpPr>
+          <p:nvPr/>
+        </p:nvSpPr>
+        <p:spPr>
+          <a:xfrm>
+            <a:off x="735624" y="685671"/>
+            <a:ext cx="6553200" cy="527665"/>
+          </a:xfrm>
+          <a:prstGeom prst="rect">
+            <a:avLst/>
+          </a:prstGeom>
+        </p:spPr>
+        <p:txBody>
+          <a:bodyPr/>
+          <a:lstStyle>
+            <a:lvl1pPr marL="228600" indent="-228600" algn="l" defTabSz="914400" rtl="0" eaLnBrk="1" latinLnBrk="0" hangingPunct="1">
+              <a:lnSpc>
+                <a:spcPct val="90000"/>
+              </a:lnSpc>
+              <a:spcBef>
+                <a:spcPts val="1000"/>
+              </a:spcBef>
+              <a:buFont typeface="Arial" panose="020B0604020202020204" pitchFamily="34" charset="0"/>
+              <a:buChar char="•"/>
+              <a:defRPr sz="2800" kern="1200">
+                <a:solidFill>
+                  <a:schemeClr val="tx1"/>
+                </a:solidFill>
+                <a:latin typeface="+mn-lt"/>
+                <a:ea typeface="+mn-ea"/>
+                <a:cs typeface="+mn-cs"/>
+              </a:defRPr>
+            </a:lvl1pPr>
+            <a:lvl2pPr marL="685800" indent="-228600" algn="l" defTabSz="914400" rtl="0" eaLnBrk="1" latinLnBrk="0" hangingPunct="1">
+              <a:lnSpc>
+                <a:spcPct val="90000"/>
+              </a:lnSpc>
+              <a:spcBef>
+                <a:spcPts val="500"/>
+              </a:spcBef>
+              <a:buFont typeface="Arial" panose="020B0604020202020204" pitchFamily="34" charset="0"/>
+              <a:buChar char="•"/>
+              <a:defRPr sz="2400" kern="1200">
+                <a:solidFill>
+                  <a:schemeClr val="tx1"/>
+                </a:solidFill>
+                <a:latin typeface="+mn-lt"/>
+                <a:ea typeface="+mn-ea"/>
+                <a:cs typeface="+mn-cs"/>
+              </a:defRPr>
+            </a:lvl2pPr>
+            <a:lvl3pPr marL="1143000" indent="-228600" algn="l" defTabSz="914400" rtl="0" eaLnBrk="1" latinLnBrk="0" hangingPunct="1">
+              <a:lnSpc>
+                <a:spcPct val="90000"/>
+              </a:lnSpc>
+              <a:spcBef>
+                <a:spcPts val="500"/>
+              </a:spcBef>
+              <a:buFont typeface="Arial" panose="020B0604020202020204" pitchFamily="34" charset="0"/>
+              <a:buChar char="•"/>
+              <a:defRPr sz="2000" kern="1200">
+                <a:solidFill>
+                  <a:schemeClr val="tx1"/>
+                </a:solidFill>
+                <a:latin typeface="+mn-lt"/>
+                <a:ea typeface="+mn-ea"/>
+                <a:cs typeface="+mn-cs"/>
+              </a:defRPr>
+            </a:lvl3pPr>
+            <a:lvl4pPr marL="1600200" indent="-228600" algn="l" defTabSz="914400" rtl="0" eaLnBrk="1" latinLnBrk="0" hangingPunct="1">
+              <a:lnSpc>
+                <a:spcPct val="90000"/>
+              </a:lnSpc>
+              <a:spcBef>
+                <a:spcPts val="500"/>
+              </a:spcBef>
+              <a:buFont typeface="Arial" panose="020B0604020202020204" pitchFamily="34" charset="0"/>
+              <a:buChar char="•"/>
+              <a:defRPr sz="1800" kern="1200">
+                <a:solidFill>
+                  <a:schemeClr val="tx1"/>
+                </a:solidFill>
+                <a:latin typeface="+mn-lt"/>
+                <a:ea typeface="+mn-ea"/>
+                <a:cs typeface="+mn-cs"/>
+              </a:defRPr>
+            </a:lvl4pPr>
+            <a:lvl5pPr marL="2057400" indent="-228600" algn="l" defTabSz="914400" rtl="0" eaLnBrk="1" latinLnBrk="0" hangingPunct="1">
+              <a:lnSpc>
+                <a:spcPct val="90000"/>
+              </a:lnSpc>
+              <a:spcBef>
+                <a:spcPts val="500"/>
+              </a:spcBef>
+              <a:buFont typeface="Arial" panose="020B0604020202020204" pitchFamily="34" charset="0"/>
+              <a:buChar char="•"/>
+              <a:defRPr sz="1800" kern="1200">
+                <a:solidFill>
+                  <a:schemeClr val="tx1"/>
+                </a:solidFill>
+                <a:latin typeface="+mn-lt"/>
+                <a:ea typeface="+mn-ea"/>
+                <a:cs typeface="+mn-cs"/>
+              </a:defRPr>
+            </a:lvl5pPr>
+            <a:lvl6pPr marL="2514600" indent="-228600" algn="l" defTabSz="914400" rtl="0" eaLnBrk="1" latinLnBrk="0" hangingPunct="1">
+              <a:lnSpc>
+                <a:spcPct val="90000"/>
+              </a:lnSpc>
+              <a:spcBef>
+                <a:spcPts val="500"/>
+              </a:spcBef>
+              <a:buFont typeface="Arial" panose="020B0604020202020204" pitchFamily="34" charset="0"/>
+              <a:buChar char="•"/>
+              <a:defRPr sz="1800" kern="1200">
+                <a:solidFill>
+                  <a:schemeClr val="tx1"/>
+                </a:solidFill>
+                <a:latin typeface="+mn-lt"/>
+                <a:ea typeface="+mn-ea"/>
+                <a:cs typeface="+mn-cs"/>
+              </a:defRPr>
+            </a:lvl6pPr>
+            <a:lvl7pPr marL="2971800" indent="-228600" algn="l" defTabSz="914400" rtl="0" eaLnBrk="1" latinLnBrk="0" hangingPunct="1">
+              <a:lnSpc>
+                <a:spcPct val="90000"/>
+              </a:lnSpc>
+              <a:spcBef>
+                <a:spcPts val="500"/>
+              </a:spcBef>
+              <a:buFont typeface="Arial" panose="020B0604020202020204" pitchFamily="34" charset="0"/>
+              <a:buChar char="•"/>
+              <a:defRPr sz="1800" kern="1200">
+                <a:solidFill>
+                  <a:schemeClr val="tx1"/>
+                </a:solidFill>
+                <a:latin typeface="+mn-lt"/>
+                <a:ea typeface="+mn-ea"/>
+                <a:cs typeface="+mn-cs"/>
+              </a:defRPr>
+            </a:lvl7pPr>
+            <a:lvl8pPr marL="3429000" indent="-228600" algn="l" defTabSz="914400" rtl="0" eaLnBrk="1" latinLnBrk="0" hangingPunct="1">
+              <a:lnSpc>
+                <a:spcPct val="90000"/>
+              </a:lnSpc>
+              <a:spcBef>
+                <a:spcPts val="500"/>
+              </a:spcBef>
+              <a:buFont typeface="Arial" panose="020B0604020202020204" pitchFamily="34" charset="0"/>
+              <a:buChar char="•"/>
+              <a:defRPr sz="1800" kern="1200">
+                <a:solidFill>
+                  <a:schemeClr val="tx1"/>
+                </a:solidFill>
+                <a:latin typeface="+mn-lt"/>
+                <a:ea typeface="+mn-ea"/>
+                <a:cs typeface="+mn-cs"/>
+              </a:defRPr>
+            </a:lvl8pPr>
+            <a:lvl9pPr marL="3886200" indent="-228600" algn="l" defTabSz="914400" rtl="0" eaLnBrk="1" latinLnBrk="0" hangingPunct="1">
+              <a:lnSpc>
+                <a:spcPct val="90000"/>
+              </a:lnSpc>
+              <a:spcBef>
+                <a:spcPts val="500"/>
+              </a:spcBef>
+              <a:buFont typeface="Arial" panose="020B0604020202020204" pitchFamily="34" charset="0"/>
+              <a:buChar char="•"/>
+              <a:defRPr sz="1800" kern="1200">
+                <a:solidFill>
+                  <a:schemeClr val="tx1"/>
+                </a:solidFill>
+                <a:latin typeface="+mn-lt"/>
+                <a:ea typeface="+mn-ea"/>
+                <a:cs typeface="+mn-cs"/>
+              </a:defRPr>
+            </a:lvl9pPr>
+          </a:lstStyle>
+          <a:p>
+            <a:pPr marL="0" indent="0">
+              <a:buNone/>
+            </a:pPr>
+            <a:r>
+              <a:rPr lang="de-DE" b="1" dirty="0"/>
+              <a:t>Stakeholderanalyse</a:t>
+            </a:r>
+          </a:p>
+        </p:txBody>
+      </p:sp>
+      <p:sp>
+        <p:nvSpPr>
+          <p:cNvPr id="12" name="Rechteck 11">
+            <a:extLst>
+              <a:ext uri="{FF2B5EF4-FFF2-40B4-BE49-F238E27FC236}">
+                <a16:creationId xmlns:a16="http://schemas.microsoft.com/office/drawing/2014/main" id="{C4F51B0A-A4EB-61AF-5BCD-F09A8CEEF3C1}"/>
+              </a:ext>
+            </a:extLst>
+          </p:cNvPr>
+          <p:cNvSpPr/>
+          <p:nvPr/>
+        </p:nvSpPr>
+        <p:spPr bwMode="gray">
+          <a:xfrm>
+            <a:off x="334963" y="307818"/>
+            <a:ext cx="11522074" cy="6027250"/>
+          </a:xfrm>
+          <a:prstGeom prst="rect">
+            <a:avLst/>
+          </a:prstGeom>
+          <a:noFill/>
+          <a:ln w="76200">
+            <a:solidFill>
+              <a:schemeClr val="bg1"/>
+            </a:solidFill>
+          </a:ln>
+        </p:spPr>
+        <p:style>
+          <a:lnRef idx="2">
+            <a:schemeClr val="accent1">
+              <a:shade val="50000"/>
+            </a:schemeClr>
+          </a:lnRef>
+          <a:fillRef idx="1">
+            <a:schemeClr val="accent1"/>
+          </a:fillRef>
+          <a:effectRef idx="0">
+            <a:schemeClr val="accent1"/>
+          </a:effectRef>
+          <a:fontRef idx="minor">
+            <a:schemeClr val="lt1"/>
+          </a:fontRef>
+        </p:style>
+        <p:txBody>
+          <a:bodyPr rot="0" spcFirstLastPara="0" vertOverflow="overflow" horzOverflow="overflow" vert="horz" wrap="square" lIns="72000" tIns="72000" rIns="72000" bIns="72000" numCol="1" spcCol="0" rtlCol="0" fromWordArt="0" anchor="ctr" anchorCtr="0" forceAA="0" compatLnSpc="1">
+            <a:prstTxWarp prst="textNoShape">
+              <a:avLst/>
+            </a:prstTxWarp>
+            <a:noAutofit/>
+          </a:bodyPr>
+          <a:lstStyle/>
+          <a:p>
+            <a:pPr algn="ctr"/>
+            <a:endParaRPr lang="de-DE" dirty="0">
+              <a:solidFill>
+                <a:schemeClr val="tx2"/>
+              </a:solidFill>
+            </a:endParaRPr>
+          </a:p>
+        </p:txBody>
+      </p:sp>
+      <p:pic>
+        <p:nvPicPr>
+          <p:cNvPr id="3" name="Grafik 2">
+            <a:extLst>
+              <a:ext uri="{FF2B5EF4-FFF2-40B4-BE49-F238E27FC236}">
+                <a16:creationId xmlns:a16="http://schemas.microsoft.com/office/drawing/2014/main" id="{B255B815-730B-C1EF-85DA-B59B963FC20E}"/>
+              </a:ext>
+            </a:extLst>
+          </p:cNvPr>
+          <p:cNvPicPr>
+            <a:picLocks noChangeAspect="1"/>
+          </p:cNvPicPr>
+          <p:nvPr/>
+        </p:nvPicPr>
+        <p:blipFill>
+          <a:blip r:embed="rId3">
+            <a:extLst>
+              <a:ext uri="{28A0092B-C50C-407E-A947-70E740481C1C}">
+                <a14:useLocalDpi xmlns:a14="http://schemas.microsoft.com/office/drawing/2010/main" val="0"/>
+              </a:ext>
+            </a:extLst>
+          </a:blip>
+          <a:stretch>
+            <a:fillRect/>
+          </a:stretch>
+        </p:blipFill>
+        <p:spPr>
+          <a:xfrm>
+            <a:off x="3261917" y="1495155"/>
+            <a:ext cx="5668166" cy="3867690"/>
+          </a:xfrm>
+          <a:prstGeom prst="rect">
+            <a:avLst/>
+          </a:prstGeom>
+        </p:spPr>
+      </p:pic>
+    </p:spTree>
+    <p:extLst>
+      <p:ext uri="{BB962C8B-B14F-4D97-AF65-F5344CB8AC3E}">
+        <p14:creationId xmlns:p14="http://schemas.microsoft.com/office/powerpoint/2010/main" val="2787061857"/>
+      </p:ext>
+    </p:extLst>
+  </p:cSld>
+  <p:clrMapOvr>
+    <a:masterClrMapping/>
+  </p:clrMapOvr>
+  <mc:AlternateContent xmlns:mc="http://schemas.openxmlformats.org/markup-compatibility/2006">
+    <mc:Choice xmlns:p14="http://schemas.microsoft.com/office/powerpoint/2010/main" Requires="p14">
+      <p:transition spd="med" p14:dur="700">
+        <p:fade/>
+      </p:transition>
+    </mc:Choice>
+    <mc:Fallback>
       <p:transition spd="med">
         <p:fade/>
       </p:transition>

</xml_diff>